<commit_message>
Ajustes no slide de apresentação
</commit_message>
<xml_diff>
--- a/Apresentação/Apresentação TCC.pptx
+++ b/Apresentação/Apresentação TCC.pptx
@@ -5,10 +5,10 @@
     <p:sldMasterId id="2147483648" r:id="rId1"/>
   </p:sldMasterIdLst>
   <p:notesMasterIdLst>
-    <p:notesMasterId r:id="rId13"/>
+    <p:notesMasterId r:id="rId14"/>
   </p:notesMasterIdLst>
   <p:handoutMasterIdLst>
-    <p:handoutMasterId r:id="rId14"/>
+    <p:handoutMasterId r:id="rId15"/>
   </p:handoutMasterIdLst>
   <p:sldIdLst>
     <p:sldId id="302" r:id="rId2"/>
@@ -21,7 +21,8 @@
     <p:sldId id="311" r:id="rId9"/>
     <p:sldId id="308" r:id="rId10"/>
     <p:sldId id="309" r:id="rId11"/>
-    <p:sldId id="312" r:id="rId12"/>
+    <p:sldId id="313" r:id="rId12"/>
+    <p:sldId id="312" r:id="rId13"/>
   </p:sldIdLst>
   <p:sldSz cx="9144000" cy="6858000" type="screen4x3"/>
   <p:notesSz cx="6858000" cy="9144000"/>
@@ -251,7 +252,7 @@
               <a:pPr>
                 <a:defRPr/>
               </a:pPr>
-              <a:t>17/05/2019</a:t>
+              <a:t>22/05/2019</a:t>
             </a:fld>
             <a:endParaRPr lang="pt-BR"/>
           </a:p>
@@ -445,7 +446,7 @@
               <a:pPr>
                 <a:defRPr/>
               </a:pPr>
-              <a:t>17/05/2019</a:t>
+              <a:t>22/05/2019</a:t>
             </a:fld>
             <a:endParaRPr lang="pt-BR"/>
           </a:p>
@@ -4060,15 +4061,8 @@
                 <a:latin typeface="Arial" charset="0"/>
                 <a:cs typeface="Arial" charset="0"/>
               </a:rPr>
-              <a:t>Diego Fraga de Oliveira</a:t>
-            </a:r>
-            <a:endParaRPr lang="pt-BR" altLang="pt-BR" sz="2000" kern="0" dirty="0">
-              <a:solidFill>
-                <a:srgbClr val="000000"/>
-              </a:solidFill>
-              <a:latin typeface="Arial" charset="0"/>
-              <a:cs typeface="Arial" charset="0"/>
-            </a:endParaRPr>
+              <a:t>DIEGO FRAGA DE OLIVEIRA</a:t>
+            </a:r>
           </a:p>
           <a:p>
             <a:pPr marL="342900" indent="-342900">
@@ -4085,15 +4079,8 @@
                 <a:latin typeface="Arial" charset="0"/>
                 <a:cs typeface="Arial" charset="0"/>
               </a:rPr>
-              <a:t>Rafael Sana Montevechio</a:t>
-            </a:r>
-            <a:endParaRPr lang="pt-BR" altLang="pt-BR" sz="2000" kern="0" dirty="0">
-              <a:solidFill>
-                <a:srgbClr val="000000"/>
-              </a:solidFill>
-              <a:latin typeface="Arial" charset="0"/>
-              <a:cs typeface="Arial" charset="0"/>
-            </a:endParaRPr>
+              <a:t>RAFAEL SANA MONTEVECHIO</a:t>
+            </a:r>
           </a:p>
           <a:p>
             <a:pPr marL="342900" indent="-342900">
@@ -4110,17 +4097,7 @@
                 <a:latin typeface="Arial" charset="0"/>
                 <a:cs typeface="Arial" charset="0"/>
               </a:rPr>
-              <a:t>Prof. </a:t>
-            </a:r>
-            <a:r>
-              <a:rPr lang="pt-BR" altLang="pt-BR" sz="2000" kern="0" dirty="0" smtClean="0">
-                <a:solidFill>
-                  <a:srgbClr val="000000"/>
-                </a:solidFill>
-                <a:latin typeface="Arial" charset="0"/>
-                <a:cs typeface="Arial" charset="0"/>
-              </a:rPr>
-              <a:t>Orientador: Rodrigo Luís de Faria</a:t>
+              <a:t>Prof. Orientador: Rodrigo Luís de Faria</a:t>
             </a:r>
             <a:endParaRPr lang="pt-BR" altLang="pt-BR" sz="2000" kern="0" dirty="0">
               <a:solidFill>
@@ -4210,7 +4187,7 @@
         <p:spPr>
           <a:xfrm>
             <a:off x="785813" y="1700808"/>
-            <a:ext cx="7962900" cy="4464496"/>
+            <a:ext cx="7962900" cy="3528392"/>
           </a:xfrm>
           <a:prstGeom prst="rect">
             <a:avLst/>
@@ -4225,7 +4202,7 @@
           <a:bodyPr/>
           <a:lstStyle/>
           <a:p>
-            <a:pPr marL="342900" indent="-342900" algn="just" eaLnBrk="0" hangingPunct="0">
+            <a:pPr marL="342900" indent="-342900" algn="l" eaLnBrk="0" hangingPunct="0">
               <a:spcBef>
                 <a:spcPct val="20000"/>
               </a:spcBef>
@@ -4235,35 +4212,35 @@
               <a:defRPr/>
             </a:pPr>
             <a:r>
-              <a:rPr lang="pt-BR" sz="1400" dirty="0" smtClean="0">
+              <a:rPr lang="pt-BR" sz="1600" dirty="0" smtClean="0">
                 <a:latin typeface="Arial" pitchFamily="34" charset="0"/>
                 <a:cs typeface="Arial" pitchFamily="34" charset="0"/>
               </a:rPr>
               <a:t>ANGULAR. </a:t>
             </a:r>
             <a:r>
-              <a:rPr lang="pt-BR" sz="1400" b="1" dirty="0" smtClean="0">
+              <a:rPr lang="pt-BR" sz="1600" b="1" dirty="0" smtClean="0">
                 <a:latin typeface="Arial" pitchFamily="34" charset="0"/>
                 <a:cs typeface="Arial" pitchFamily="34" charset="0"/>
               </a:rPr>
               <a:t>Angular - </a:t>
             </a:r>
             <a:r>
-              <a:rPr lang="pt-BR" sz="1400" dirty="0" smtClean="0">
+              <a:rPr lang="pt-BR" sz="1600" dirty="0" smtClean="0">
                 <a:latin typeface="Arial" pitchFamily="34" charset="0"/>
                 <a:cs typeface="Arial" pitchFamily="34" charset="0"/>
               </a:rPr>
               <a:t>what is Angular</a:t>
             </a:r>
             <a:r>
-              <a:rPr lang="pt-BR" sz="1400" b="1" dirty="0" smtClean="0">
+              <a:rPr lang="pt-BR" sz="1600" b="1" dirty="0" smtClean="0">
                 <a:latin typeface="Arial" pitchFamily="34" charset="0"/>
                 <a:cs typeface="Arial" pitchFamily="34" charset="0"/>
               </a:rPr>
               <a:t>.</a:t>
             </a:r>
             <a:r>
-              <a:rPr lang="pt-BR" sz="1400" dirty="0" smtClean="0">
+              <a:rPr lang="pt-BR" sz="1600" dirty="0" smtClean="0">
                 <a:latin typeface="Arial" pitchFamily="34" charset="0"/>
                 <a:cs typeface="Arial" pitchFamily="34" charset="0"/>
               </a:rPr>
@@ -4271,7 +4248,7 @@
             </a:r>
           </a:p>
           <a:p>
-            <a:pPr marL="342900" indent="-342900" algn="just" eaLnBrk="0" hangingPunct="0">
+            <a:pPr marL="342900" indent="-342900" algn="l" eaLnBrk="0" hangingPunct="0">
               <a:spcBef>
                 <a:spcPct val="20000"/>
               </a:spcBef>
@@ -4281,21 +4258,21 @@
               <a:defRPr/>
             </a:pPr>
             <a:r>
-              <a:rPr lang="pt-BR" sz="1400" dirty="0" smtClean="0">
+              <a:rPr lang="pt-BR" sz="1600" dirty="0" smtClean="0">
                 <a:latin typeface="Arial" pitchFamily="34" charset="0"/>
                 <a:cs typeface="Arial" pitchFamily="34" charset="0"/>
               </a:rPr>
               <a:t>FIREBASE. </a:t>
             </a:r>
             <a:r>
-              <a:rPr lang="pt-BR" sz="1400" b="1" dirty="0" smtClean="0">
+              <a:rPr lang="pt-BR" sz="1600" b="1" dirty="0" smtClean="0">
                 <a:latin typeface="Arial" pitchFamily="34" charset="0"/>
                 <a:cs typeface="Arial" pitchFamily="34" charset="0"/>
               </a:rPr>
               <a:t>Firebase.</a:t>
             </a:r>
             <a:r>
-              <a:rPr lang="pt-BR" sz="1400" dirty="0" smtClean="0">
+              <a:rPr lang="pt-BR" sz="1600" dirty="0" smtClean="0">
                 <a:latin typeface="Arial" pitchFamily="34" charset="0"/>
                 <a:cs typeface="Arial" pitchFamily="34" charset="0"/>
               </a:rPr>
@@ -4303,7 +4280,7 @@
             </a:r>
           </a:p>
           <a:p>
-            <a:pPr marL="342900" indent="-342900" algn="just" eaLnBrk="0" hangingPunct="0">
+            <a:pPr marL="342900" indent="-342900" algn="l" eaLnBrk="0" hangingPunct="0">
               <a:spcBef>
                 <a:spcPct val="20000"/>
               </a:spcBef>
@@ -4313,41 +4290,26 @@
               <a:defRPr/>
             </a:pPr>
             <a:r>
-              <a:rPr lang="en-US" sz="1400" dirty="0" smtClean="0">
+              <a:rPr lang="en-US" sz="1600" dirty="0" smtClean="0">
                 <a:latin typeface="Arial" pitchFamily="34" charset="0"/>
                 <a:cs typeface="Arial" pitchFamily="34" charset="0"/>
               </a:rPr>
               <a:t>IONIC FRAMEWORK. </a:t>
             </a:r>
             <a:r>
-              <a:rPr lang="en-US" sz="1400" b="1" dirty="0" smtClean="0">
+              <a:rPr lang="en-US" sz="1600" b="1" dirty="0" smtClean="0">
                 <a:latin typeface="Arial" pitchFamily="34" charset="0"/>
                 <a:cs typeface="Arial" pitchFamily="34" charset="0"/>
               </a:rPr>
               <a:t>About ionic cross-platform mobile development technologies. </a:t>
             </a:r>
             <a:r>
-              <a:rPr lang="pt-BR" sz="1400" dirty="0" smtClean="0">
+              <a:rPr lang="pt-BR" sz="1600" dirty="0" smtClean="0">
                 <a:latin typeface="Arial" pitchFamily="34" charset="0"/>
                 <a:cs typeface="Arial" pitchFamily="34" charset="0"/>
               </a:rPr>
               <a:t>Disponível em: &lt;https://ionicframework.com/about&gt; Acesso em 17 mar. 2019.</a:t>
             </a:r>
-          </a:p>
-          <a:p>
-            <a:pPr marL="342900" indent="-342900" algn="just" eaLnBrk="0" hangingPunct="0">
-              <a:spcBef>
-                <a:spcPct val="20000"/>
-              </a:spcBef>
-              <a:spcAft>
-                <a:spcPts val="600"/>
-              </a:spcAft>
-              <a:defRPr/>
-            </a:pPr>
-            <a:endParaRPr lang="pt-BR" sz="1400" dirty="0" smtClean="0">
-              <a:latin typeface="Arial" pitchFamily="34" charset="0"/>
-              <a:cs typeface="Arial" pitchFamily="34" charset="0"/>
-            </a:endParaRPr>
           </a:p>
           <a:p>
             <a:pPr algn="just">
@@ -4356,21 +4318,21 @@
               </a:spcAft>
             </a:pPr>
             <a:r>
-              <a:rPr lang="pt-BR" sz="1400" dirty="0" smtClean="0">
+              <a:rPr lang="pt-BR" sz="1600" dirty="0" smtClean="0">
                 <a:latin typeface="Arial" pitchFamily="34" charset="0"/>
                 <a:cs typeface="Arial" pitchFamily="34" charset="0"/>
               </a:rPr>
               <a:t>SILVA, Maurício S. </a:t>
             </a:r>
             <a:r>
-              <a:rPr lang="pt-BR" sz="1400" b="1" dirty="0" smtClean="0">
+              <a:rPr lang="pt-BR" sz="1600" b="1" dirty="0" smtClean="0">
                 <a:latin typeface="Arial" pitchFamily="34" charset="0"/>
                 <a:cs typeface="Arial" pitchFamily="34" charset="0"/>
               </a:rPr>
               <a:t>Desenvolva aplicações web profissionais com uso dos poderosos recursos de estilização das CSS3.</a:t>
             </a:r>
             <a:r>
-              <a:rPr lang="pt-BR" sz="1400" dirty="0" smtClean="0">
+              <a:rPr lang="pt-BR" sz="1600" dirty="0" smtClean="0">
                 <a:latin typeface="Arial" pitchFamily="34" charset="0"/>
                 <a:cs typeface="Arial" pitchFamily="34" charset="0"/>
               </a:rPr>
@@ -4378,130 +4340,13 @@
             </a:r>
           </a:p>
           <a:p>
-            <a:pPr algn="just">
-              <a:spcAft>
-                <a:spcPts val="600"/>
-              </a:spcAft>
-            </a:pPr>
-            <a:r>
-              <a:rPr lang="pt-BR" sz="1400" dirty="0" smtClean="0">
-                <a:latin typeface="Arial" pitchFamily="34" charset="0"/>
-                <a:cs typeface="Arial" pitchFamily="34" charset="0"/>
-              </a:rPr>
-              <a:t> </a:t>
-            </a:r>
-          </a:p>
-          <a:p>
-            <a:pPr algn="just">
-              <a:spcAft>
-                <a:spcPts val="600"/>
-              </a:spcAft>
-            </a:pPr>
-            <a:r>
-              <a:rPr lang="pt-BR" sz="1400" dirty="0" smtClean="0">
-                <a:latin typeface="Arial" pitchFamily="34" charset="0"/>
-                <a:cs typeface="Arial" pitchFamily="34" charset="0"/>
-              </a:rPr>
-              <a:t>______. </a:t>
-            </a:r>
-            <a:r>
-              <a:rPr lang="pt-BR" sz="1400" b="1" dirty="0" smtClean="0">
-                <a:latin typeface="Arial" pitchFamily="34" charset="0"/>
-                <a:cs typeface="Arial" pitchFamily="34" charset="0"/>
-              </a:rPr>
-              <a:t>Fundamentos de HTML5 e CSS3. </a:t>
-            </a:r>
-            <a:r>
-              <a:rPr lang="pt-BR" sz="1400" dirty="0" smtClean="0">
-                <a:latin typeface="Arial" pitchFamily="34" charset="0"/>
-                <a:cs typeface="Arial" pitchFamily="34" charset="0"/>
-              </a:rPr>
-              <a:t>2015</a:t>
-            </a:r>
-            <a:r>
-              <a:rPr lang="pt-BR" sz="1400" b="1" dirty="0" smtClean="0">
-                <a:latin typeface="Arial" pitchFamily="34" charset="0"/>
-                <a:cs typeface="Arial" pitchFamily="34" charset="0"/>
-              </a:rPr>
-              <a:t>.</a:t>
-            </a:r>
-            <a:r>
-              <a:rPr lang="pt-BR" sz="1400" dirty="0" smtClean="0">
-                <a:latin typeface="Arial" pitchFamily="34" charset="0"/>
-                <a:cs typeface="Arial" pitchFamily="34" charset="0"/>
-              </a:rPr>
-              <a:t> Disponível em: &lt;https://books.google.com.br/books?id=2iPYCQAAQBAJ&amp;printsec=frontcover&amp;hl=pt-BR&amp;source=gbs_ViewAPI&amp;output=embed&amp;redir_esc=y#%257B%257D&gt; Acesso em 21 mar. 2019.</a:t>
-            </a:r>
-          </a:p>
-          <a:p>
-            <a:pPr marL="342900" indent="-342900" algn="just" eaLnBrk="0" hangingPunct="0">
-              <a:spcBef>
-                <a:spcPct val="20000"/>
-              </a:spcBef>
-              <a:spcAft>
-                <a:spcPts val="600"/>
-              </a:spcAft>
-              <a:defRPr/>
-            </a:pPr>
-            <a:r>
-              <a:rPr lang="pt-BR" sz="1400" dirty="0" smtClean="0">
-                <a:latin typeface="Arial" pitchFamily="34" charset="0"/>
-                <a:cs typeface="Arial" pitchFamily="34" charset="0"/>
-              </a:rPr>
-              <a:t>SMYTH, Neil. </a:t>
-            </a:r>
-            <a:r>
-              <a:rPr lang="pt-BR" sz="1400" b="1" dirty="0" smtClean="0">
-                <a:latin typeface="Arial" pitchFamily="34" charset="0"/>
-                <a:cs typeface="Arial" pitchFamily="34" charset="0"/>
-              </a:rPr>
-              <a:t>Firebase essentials. </a:t>
-            </a:r>
-            <a:r>
-              <a:rPr lang="pt-BR" sz="1400" dirty="0" smtClean="0">
-                <a:latin typeface="Arial" pitchFamily="34" charset="0"/>
-                <a:cs typeface="Arial" pitchFamily="34" charset="0"/>
-              </a:rPr>
-              <a:t>Disponível em:  &lt;https://www.ebookfrenzy.com/pdf_previews/FirebaseEssentialsAndroidPreview.pdf&gt; 2017. Acesso em 17 mar. 2019.</a:t>
-            </a:r>
-          </a:p>
-          <a:p>
-            <a:pPr marL="342900" indent="-342900" algn="just" eaLnBrk="0" hangingPunct="0">
+            <a:pPr algn="just" eaLnBrk="0" hangingPunct="0">
               <a:lnSpc>
                 <a:spcPct val="150000"/>
               </a:lnSpc>
               <a:spcBef>
                 <a:spcPct val="20000"/>
               </a:spcBef>
-              <a:defRPr/>
-            </a:pPr>
-            <a:endParaRPr lang="pt-BR" sz="1400" dirty="0"/>
-          </a:p>
-          <a:p>
-            <a:pPr marL="342900" indent="-342900" algn="just" eaLnBrk="0" hangingPunct="0">
-              <a:lnSpc>
-                <a:spcPct val="150000"/>
-              </a:lnSpc>
-              <a:spcBef>
-                <a:spcPct val="20000"/>
-              </a:spcBef>
-              <a:defRPr/>
-            </a:pPr>
-            <a:endParaRPr lang="pt-BR" sz="2800" kern="0" dirty="0">
-              <a:latin typeface="Arial" pitchFamily="34" charset="0"/>
-              <a:cs typeface="Arial" pitchFamily="34" charset="0"/>
-            </a:endParaRPr>
-          </a:p>
-          <a:p>
-            <a:pPr marL="342900" indent="-342900" algn="just" eaLnBrk="0" hangingPunct="0">
-              <a:lnSpc>
-                <a:spcPct val="150000"/>
-              </a:lnSpc>
-              <a:spcBef>
-                <a:spcPct val="20000"/>
-              </a:spcBef>
-              <a:buFontTx/>
-              <a:buChar char="•"/>
               <a:defRPr/>
             </a:pPr>
             <a:endParaRPr lang="pt-BR" sz="2800" kern="0" dirty="0">
@@ -4527,6 +4372,201 @@
 </file>
 
 <file path=ppt/slides/slide11.xml><?xml version="1.0" encoding="utf-8"?>
+<p:sld xmlns:a="http://schemas.openxmlformats.org/drawingml/2006/main" xmlns:r="http://schemas.openxmlformats.org/officeDocument/2006/relationships" xmlns:p="http://schemas.openxmlformats.org/presentationml/2006/main" showMasterPhAnim="0">
+  <p:cSld>
+    <p:spTree>
+      <p:nvGrpSpPr>
+        <p:cNvPr id="1" name=""/>
+        <p:cNvGrpSpPr/>
+        <p:nvPr/>
+      </p:nvGrpSpPr>
+      <p:grpSpPr>
+        <a:xfrm>
+          <a:off x="0" y="0"/>
+          <a:ext cx="0" cy="0"/>
+          <a:chOff x="0" y="0"/>
+          <a:chExt cx="0" cy="0"/>
+        </a:xfrm>
+      </p:grpSpPr>
+      <p:sp>
+        <p:nvSpPr>
+          <p:cNvPr id="11266" name="Rectangle 4"/>
+          <p:cNvSpPr>
+            <a:spLocks noGrp="1" noChangeArrowheads="1"/>
+          </p:cNvSpPr>
+          <p:nvPr>
+            <p:ph type="title" idx="4294967295"/>
+          </p:nvPr>
+        </p:nvSpPr>
+        <p:spPr>
+          <a:xfrm>
+            <a:off x="3143250" y="214313"/>
+            <a:ext cx="5821238" cy="914400"/>
+          </a:xfrm>
+        </p:spPr>
+        <p:txBody>
+          <a:bodyPr/>
+          <a:lstStyle/>
+          <a:p>
+            <a:pPr algn="ctr" eaLnBrk="1" hangingPunct="1"/>
+            <a:r>
+              <a:rPr lang="pt-BR" altLang="pt-BR" sz="4400" b="0" dirty="0" smtClean="0">
+                <a:latin typeface="Arial" charset="0"/>
+                <a:cs typeface="Arial" charset="0"/>
+              </a:rPr>
+              <a:t>Referências Principais</a:t>
+            </a:r>
+            <a:endParaRPr lang="en-US" altLang="pt-BR" sz="4400" b="0" dirty="0" smtClean="0">
+              <a:latin typeface="Arial" charset="0"/>
+              <a:cs typeface="Arial" charset="0"/>
+            </a:endParaRPr>
+          </a:p>
+        </p:txBody>
+      </p:sp>
+      <p:sp>
+        <p:nvSpPr>
+          <p:cNvPr id="4" name="Rectangle 3"/>
+          <p:cNvSpPr txBox="1">
+            <a:spLocks noChangeArrowheads="1"/>
+          </p:cNvSpPr>
+          <p:nvPr/>
+        </p:nvSpPr>
+        <p:spPr>
+          <a:xfrm>
+            <a:off x="785813" y="1700808"/>
+            <a:ext cx="7962900" cy="2160240"/>
+          </a:xfrm>
+          <a:prstGeom prst="rect">
+            <a:avLst/>
+          </a:prstGeom>
+          <a:ln>
+            <a:solidFill>
+              <a:schemeClr val="tx1"/>
+            </a:solidFill>
+          </a:ln>
+        </p:spPr>
+        <p:txBody>
+          <a:bodyPr/>
+          <a:lstStyle/>
+          <a:p>
+            <a:pPr algn="just">
+              <a:spcAft>
+                <a:spcPts val="600"/>
+              </a:spcAft>
+            </a:pPr>
+            <a:r>
+              <a:rPr lang="pt-BR" sz="1600" dirty="0">
+                <a:latin typeface="Arial" pitchFamily="34" charset="0"/>
+                <a:cs typeface="Arial" pitchFamily="34" charset="0"/>
+              </a:rPr>
+              <a:t>SILVA, Maurício S</a:t>
+            </a:r>
+            <a:r>
+              <a:rPr lang="pt-BR" sz="1600" dirty="0" smtClean="0">
+                <a:latin typeface="Arial" pitchFamily="34" charset="0"/>
+                <a:cs typeface="Arial" pitchFamily="34" charset="0"/>
+              </a:rPr>
+              <a:t>. </a:t>
+            </a:r>
+            <a:r>
+              <a:rPr lang="pt-BR" sz="1600" b="1" dirty="0">
+                <a:latin typeface="Arial" pitchFamily="34" charset="0"/>
+                <a:cs typeface="Arial" pitchFamily="34" charset="0"/>
+              </a:rPr>
+              <a:t>Fundamentos de HTML5 e CSS3. </a:t>
+            </a:r>
+            <a:r>
+              <a:rPr lang="pt-BR" sz="1600" dirty="0">
+                <a:latin typeface="Arial" pitchFamily="34" charset="0"/>
+                <a:cs typeface="Arial" pitchFamily="34" charset="0"/>
+              </a:rPr>
+              <a:t>2015</a:t>
+            </a:r>
+            <a:r>
+              <a:rPr lang="pt-BR" sz="1600" b="1" dirty="0">
+                <a:latin typeface="Arial" pitchFamily="34" charset="0"/>
+                <a:cs typeface="Arial" pitchFamily="34" charset="0"/>
+              </a:rPr>
+              <a:t>.</a:t>
+            </a:r>
+            <a:r>
+              <a:rPr lang="pt-BR" sz="1600" dirty="0">
+                <a:latin typeface="Arial" pitchFamily="34" charset="0"/>
+                <a:cs typeface="Arial" pitchFamily="34" charset="0"/>
+              </a:rPr>
+              <a:t> Disponível em: &lt;https://books.google.com.br/books?id=2iPYCQAAQBAJ&amp;printsec=frontcover&amp;hl=pt-BR&amp;source=gbs_ViewAPI&amp;output=embed&amp;redir_esc=y#%257B%257D&gt; Acesso em 21 mar. 2019.</a:t>
+            </a:r>
+          </a:p>
+          <a:p>
+            <a:pPr marL="342900" indent="-342900" algn="just" eaLnBrk="0" hangingPunct="0">
+              <a:spcBef>
+                <a:spcPct val="20000"/>
+              </a:spcBef>
+              <a:spcAft>
+                <a:spcPts val="600"/>
+              </a:spcAft>
+              <a:defRPr/>
+            </a:pPr>
+            <a:r>
+              <a:rPr lang="pt-BR" sz="1600" dirty="0">
+                <a:latin typeface="Arial" pitchFamily="34" charset="0"/>
+                <a:cs typeface="Arial" pitchFamily="34" charset="0"/>
+              </a:rPr>
+              <a:t>SMYTH, Neil. </a:t>
+            </a:r>
+            <a:r>
+              <a:rPr lang="pt-BR" sz="1600" b="1" dirty="0">
+                <a:latin typeface="Arial" pitchFamily="34" charset="0"/>
+                <a:cs typeface="Arial" pitchFamily="34" charset="0"/>
+              </a:rPr>
+              <a:t>Firebase essentials. </a:t>
+            </a:r>
+            <a:r>
+              <a:rPr lang="pt-BR" sz="1600" dirty="0">
+                <a:latin typeface="Arial" pitchFamily="34" charset="0"/>
+                <a:cs typeface="Arial" pitchFamily="34" charset="0"/>
+              </a:rPr>
+              <a:t>Disponível em:  &lt;https://www.ebookfrenzy.com/pdf_previews/FirebaseEssentialsAndroidPreview.pdf&gt; 2017. Acesso em 17 mar. 2019.</a:t>
+            </a:r>
+          </a:p>
+          <a:p>
+            <a:pPr algn="just" eaLnBrk="0" hangingPunct="0">
+              <a:lnSpc>
+                <a:spcPct val="150000"/>
+              </a:lnSpc>
+              <a:spcBef>
+                <a:spcPct val="20000"/>
+              </a:spcBef>
+              <a:defRPr/>
+            </a:pPr>
+            <a:endParaRPr lang="pt-BR" sz="2800" kern="0" dirty="0">
+              <a:latin typeface="Arial" pitchFamily="34" charset="0"/>
+              <a:cs typeface="Arial" pitchFamily="34" charset="0"/>
+            </a:endParaRPr>
+          </a:p>
+        </p:txBody>
+      </p:sp>
+    </p:spTree>
+    <p:extLst>
+      <p:ext uri="{BB962C8B-B14F-4D97-AF65-F5344CB8AC3E}">
+        <p14:creationId xmlns:p14="http://schemas.microsoft.com/office/powerpoint/2010/main" val="2193694460"/>
+      </p:ext>
+    </p:extLst>
+  </p:cSld>
+  <p:clrMapOvr>
+    <a:masterClrMapping/>
+  </p:clrMapOvr>
+  <p:timing>
+    <p:tnLst>
+      <p:par>
+        <p:cTn id="1" dur="indefinite" restart="never" nodeType="tmRoot"/>
+      </p:par>
+    </p:tnLst>
+  </p:timing>
+</p:sld>
+</file>
+
+<file path=ppt/slides/slide12.xml><?xml version="1.0" encoding="utf-8"?>
 <p:sld xmlns:a="http://schemas.openxmlformats.org/drawingml/2006/main" xmlns:r="http://schemas.openxmlformats.org/officeDocument/2006/relationships" xmlns:p="http://schemas.openxmlformats.org/presentationml/2006/main">
   <p:cSld>
     <p:spTree>
@@ -5240,48 +5280,18 @@
           </a:p>
         </p:txBody>
       </p:sp>
-      <p:pic>
-        <p:nvPicPr>
-          <p:cNvPr id="2" name="Imagem 1"/>
-          <p:cNvPicPr>
-            <a:picLocks noChangeAspect="1"/>
-          </p:cNvPicPr>
-          <p:nvPr/>
-        </p:nvPicPr>
-        <p:blipFill>
-          <a:blip r:embed="rId2">
-            <a:extLst>
-              <a:ext uri="{28A0092B-C50C-407E-A947-70E740481C1C}">
-                <a14:useLocalDpi xmlns:a14="http://schemas.microsoft.com/office/drawing/2010/main" val="0"/>
-              </a:ext>
-            </a:extLst>
-          </a:blip>
-          <a:stretch>
-            <a:fillRect/>
-          </a:stretch>
-        </p:blipFill>
-        <p:spPr>
-          <a:xfrm>
-            <a:off x="5796136" y="1756317"/>
-            <a:ext cx="2161967" cy="3837492"/>
-          </a:xfrm>
-          <a:prstGeom prst="rect">
-            <a:avLst/>
-          </a:prstGeom>
-        </p:spPr>
-      </p:pic>
     </p:spTree>
   </p:cSld>
   <p:clrMapOvr>
     <a:masterClrMapping/>
   </p:clrMapOvr>
-  <mc:AlternateContent xmlns:mc="http://schemas.openxmlformats.org/markup-compatibility/2006">
-    <mc:Choice xmlns:p14="http://schemas.microsoft.com/office/powerpoint/2010/main" Requires="p14">
+  <mc:AlternateContent xmlns:mc="http://schemas.openxmlformats.org/markup-compatibility/2006" xmlns:p14="http://schemas.microsoft.com/office/powerpoint/2010/main">
+    <mc:Choice Requires="p14">
       <p:transition spd="slow" p14:dur="1200">
         <p:dissolve/>
       </p:transition>
     </mc:Choice>
-    <mc:Fallback>
+    <mc:Fallback xmlns="">
       <p:transition spd="slow">
         <p:dissolve/>
       </p:transition>
@@ -5448,11 +5458,11 @@
   <p:clrMapOvr>
     <a:masterClrMapping/>
   </p:clrMapOvr>
-  <mc:AlternateContent xmlns:mc="http://schemas.openxmlformats.org/markup-compatibility/2006">
-    <mc:Choice xmlns:p14="http://schemas.microsoft.com/office/powerpoint/2010/main" Requires="p14">
+  <mc:AlternateContent xmlns:mc="http://schemas.openxmlformats.org/markup-compatibility/2006" xmlns:p14="http://schemas.microsoft.com/office/powerpoint/2010/main">
+    <mc:Choice Requires="p14">
       <p:transition p14:dur="0"/>
     </mc:Choice>
-    <mc:Fallback>
+    <mc:Fallback xmlns="">
       <p:transition/>
     </mc:Fallback>
   </mc:AlternateContent>
@@ -5544,7 +5554,7 @@
           <a:bodyPr/>
           <a:lstStyle/>
           <a:p>
-            <a:pPr marL="457200" indent="-457200" algn="just" eaLnBrk="0" hangingPunct="0">
+            <a:pPr marL="457200" indent="-457200" algn="l" eaLnBrk="0" hangingPunct="0">
               <a:lnSpc>
                 <a:spcPct val="150000"/>
               </a:lnSpc>
@@ -5560,18 +5570,11 @@
                 <a:latin typeface="Arial" pitchFamily="34" charset="0"/>
                 <a:cs typeface="Arial" pitchFamily="34" charset="0"/>
               </a:rPr>
-              <a:t>Levantamento de requisitos</a:t>
-            </a:r>
-            <a:r>
-              <a:rPr lang="pt-BR" sz="2800" kern="0" dirty="0" smtClean="0">
-                <a:latin typeface="Arial" pitchFamily="34" charset="0"/>
-                <a:cs typeface="Arial" pitchFamily="34" charset="0"/>
-              </a:rPr>
-              <a:t>.</a:t>
-            </a:r>
-          </a:p>
-          <a:p>
-            <a:pPr marL="457200" indent="-457200" algn="just" eaLnBrk="0" hangingPunct="0">
+              <a:t>Levantamento de requisitos.</a:t>
+            </a:r>
+          </a:p>
+          <a:p>
+            <a:pPr marL="457200" indent="-457200" algn="l" eaLnBrk="0" hangingPunct="0">
               <a:lnSpc>
                 <a:spcPct val="150000"/>
               </a:lnSpc>
@@ -5591,7 +5594,7 @@
             </a:r>
           </a:p>
           <a:p>
-            <a:pPr marL="457200" indent="-457200" algn="just" eaLnBrk="0" hangingPunct="0">
+            <a:pPr marL="457200" indent="-457200" algn="l" eaLnBrk="0" hangingPunct="0">
               <a:lnSpc>
                 <a:spcPct val="150000"/>
               </a:lnSpc>
@@ -5611,7 +5614,7 @@
             </a:r>
           </a:p>
           <a:p>
-            <a:pPr marL="457200" indent="-457200" algn="just" eaLnBrk="0" hangingPunct="0">
+            <a:pPr marL="457200" indent="-457200" algn="l" eaLnBrk="0" hangingPunct="0">
               <a:lnSpc>
                 <a:spcPct val="150000"/>
               </a:lnSpc>
@@ -5708,8 +5711,8 @@
         </p:blipFill>
         <p:spPr bwMode="auto">
           <a:xfrm>
-            <a:off x="2676054" y="1732359"/>
-            <a:ext cx="4182417" cy="4182418"/>
+            <a:off x="2679031" y="2420888"/>
+            <a:ext cx="4341241" cy="3684344"/>
           </a:xfrm>
           <a:prstGeom prst="rect">
             <a:avLst/>
@@ -5772,7 +5775,7 @@
         <p:spPr>
           <a:xfrm>
             <a:off x="785813" y="1841872"/>
-            <a:ext cx="7962900" cy="3963392"/>
+            <a:ext cx="7962900" cy="4179416"/>
           </a:xfrm>
           <a:prstGeom prst="rect">
             <a:avLst/>
@@ -5798,6 +5801,13 @@
               <a:buChar char="•"/>
               <a:defRPr/>
             </a:pPr>
+            <a:r>
+              <a:rPr lang="pt-BR" sz="2800" kern="0" dirty="0" smtClean="0">
+                <a:latin typeface="Arial" pitchFamily="34" charset="0"/>
+                <a:cs typeface="Arial" pitchFamily="34" charset="0"/>
+              </a:rPr>
+              <a:t>Diagrama de Casos de Uso</a:t>
+            </a:r>
             <a:endParaRPr lang="pt-BR" sz="2800" kern="0" dirty="0">
               <a:latin typeface="Arial" pitchFamily="34" charset="0"/>
               <a:cs typeface="Arial" pitchFamily="34" charset="0"/>

</xml_diff>